<commit_message>
Updating risk assessment and adding acceptance criteria
</commit_message>
<xml_diff>
--- a/documentation/Fundamental Project (IMS) Presentation.pptx
+++ b/documentation/Fundamental Project (IMS) Presentation.pptx
@@ -115,6 +115,11 @@
       </a:defRPr>
     </a:lvl9pPr>
   </p:defaultTextStyle>
+  <p:extLst>
+    <p:ext uri="{EFAFB233-063F-42B5-8137-9DF3F51BA10A}">
+      <p15:sldGuideLst xmlns:p15="http://schemas.microsoft.com/office/powerpoint/2012/main"/>
+    </p:ext>
+  </p:extLst>
 </p:presentation>
 </file>
 
@@ -4059,7 +4064,9 @@
         </p:nvSpPr>
         <p:spPr/>
         <p:txBody>
-          <a:bodyPr/>
+          <a:bodyPr>
+            <a:normAutofit lnSpcReduction="10000"/>
+          </a:bodyPr>
           <a:lstStyle/>
           <a:p>
             <a:r>
@@ -4074,6 +4081,91 @@
               </a:rPr>
               <a:t>What went well? What could be improved?</a:t>
             </a:r>
+          </a:p>
+          <a:p>
+            <a:endParaRPr lang="en-GB" sz="1800" dirty="0">
+              <a:solidFill>
+                <a:srgbClr val="2E2D2C"/>
+              </a:solidFill>
+              <a:latin typeface="Montserrat Light" panose="00000400000000000000" pitchFamily="2" charset="0"/>
+              <a:ea typeface="Calibri" panose="020F0502020204030204" pitchFamily="34" charset="0"/>
+              <a:cs typeface="Symbol" panose="05050102010706020507" pitchFamily="18" charset="2"/>
+            </a:endParaRPr>
+          </a:p>
+          <a:p>
+            <a:r>
+              <a:rPr lang="en-GB" sz="1800" dirty="0">
+                <a:solidFill>
+                  <a:srgbClr val="2E2D2C"/>
+                </a:solidFill>
+                <a:latin typeface="Montserrat Light" panose="00000400000000000000" pitchFamily="2" charset="0"/>
+                <a:cs typeface="Segoe UI" panose="020B0502040204020203" pitchFamily="34" charset="0"/>
+              </a:rPr>
+              <a:t>Sprint 0 – Created detailed epics, stories, tasks and acceptance criteria. However risk assessment is not yet complete and is going to be updated as the project goes on.</a:t>
+            </a:r>
+          </a:p>
+          <a:p>
+            <a:r>
+              <a:rPr lang="en-GB" sz="1800" dirty="0">
+                <a:solidFill>
+                  <a:srgbClr val="2E2D2C"/>
+                </a:solidFill>
+                <a:latin typeface="Montserrat Light" panose="00000400000000000000" pitchFamily="2" charset="0"/>
+                <a:cs typeface="Segoe UI" panose="020B0502040204020203" pitchFamily="34" charset="0"/>
+              </a:rPr>
+              <a:t>Sprint 1 –</a:t>
+            </a:r>
+          </a:p>
+          <a:p>
+            <a:r>
+              <a:rPr lang="en-GB" sz="1800" dirty="0">
+                <a:solidFill>
+                  <a:srgbClr val="2E2D2C"/>
+                </a:solidFill>
+                <a:latin typeface="Montserrat Light" panose="00000400000000000000" pitchFamily="2" charset="0"/>
+                <a:cs typeface="Segoe UI" panose="020B0502040204020203" pitchFamily="34" charset="0"/>
+              </a:rPr>
+              <a:t>Sprint 2 –</a:t>
+            </a:r>
+          </a:p>
+          <a:p>
+            <a:r>
+              <a:rPr lang="en-GB" sz="1800" dirty="0">
+                <a:solidFill>
+                  <a:srgbClr val="2E2D2C"/>
+                </a:solidFill>
+                <a:latin typeface="Montserrat Light" panose="00000400000000000000" pitchFamily="2" charset="0"/>
+                <a:cs typeface="Segoe UI" panose="020B0502040204020203" pitchFamily="34" charset="0"/>
+              </a:rPr>
+              <a:t>Sprint 3 –</a:t>
+            </a:r>
+          </a:p>
+          <a:p>
+            <a:r>
+              <a:rPr lang="en-GB" sz="1800" dirty="0">
+                <a:solidFill>
+                  <a:srgbClr val="2E2D2C"/>
+                </a:solidFill>
+                <a:latin typeface="Montserrat Light" panose="00000400000000000000" pitchFamily="2" charset="0"/>
+                <a:cs typeface="Segoe UI" panose="020B0502040204020203" pitchFamily="34" charset="0"/>
+              </a:rPr>
+              <a:t>Sprint 4 –</a:t>
+            </a:r>
+          </a:p>
+          <a:p>
+            <a:r>
+              <a:rPr lang="en-GB" sz="1800" dirty="0">
+                <a:solidFill>
+                  <a:srgbClr val="2E2D2C"/>
+                </a:solidFill>
+                <a:latin typeface="Montserrat Light" panose="00000400000000000000" pitchFamily="2" charset="0"/>
+                <a:cs typeface="Segoe UI" panose="020B0502040204020203" pitchFamily="34" charset="0"/>
+              </a:rPr>
+              <a:t>Sprint 5 -</a:t>
+            </a:r>
+            <a:endParaRPr lang="en-GB" sz="1800" dirty="0"/>
+          </a:p>
+          <a:p>
             <a:endParaRPr lang="en-GB" sz="1800" dirty="0">
               <a:solidFill>
                 <a:srgbClr val="2E2D2C"/>
@@ -4233,7 +4325,7 @@
             <a:pPr algn="ctr"/>
             <a:r>
               <a:rPr lang="en-GB" dirty="0"/>
-              <a:t>Thank you for listening</a:t>
+              <a:t>Thank you for listening!</a:t>
             </a:r>
           </a:p>
         </p:txBody>
@@ -4363,6 +4455,69 @@
               </a:rPr>
               <a:t>Who are you? How did you approach the specification?</a:t>
             </a:r>
+          </a:p>
+          <a:p>
+            <a:r>
+              <a:rPr lang="en-GB" sz="1800" dirty="0">
+                <a:solidFill>
+                  <a:srgbClr val="2E2D2C"/>
+                </a:solidFill>
+                <a:latin typeface="Montserrat Light" panose="00000400000000000000" pitchFamily="2" charset="0"/>
+                <a:ea typeface="Calibri" panose="020F0502020204030204" pitchFamily="34" charset="0"/>
+                <a:cs typeface="Symbol" panose="05050102010706020507" pitchFamily="18" charset="2"/>
+              </a:rPr>
+              <a:t>- First of all I broke my project idea into two sections: Customer and Staff</a:t>
+            </a:r>
+          </a:p>
+          <a:p>
+            <a:r>
+              <a:rPr lang="en-GB" sz="1800" dirty="0">
+                <a:solidFill>
+                  <a:srgbClr val="2E2D2C"/>
+                </a:solidFill>
+                <a:effectLst/>
+                <a:latin typeface="Montserrat Light" panose="00000400000000000000" pitchFamily="2" charset="0"/>
+                <a:ea typeface="Calibri" panose="020F0502020204030204" pitchFamily="34" charset="0"/>
+                <a:cs typeface="Symbol" panose="05050102010706020507" pitchFamily="18" charset="2"/>
+              </a:rPr>
+              <a:t>- </a:t>
+            </a:r>
+            <a:r>
+              <a:rPr lang="en-GB" sz="1800" dirty="0">
+                <a:solidFill>
+                  <a:srgbClr val="2E2D2C"/>
+                </a:solidFill>
+                <a:latin typeface="Montserrat Light" panose="00000400000000000000" pitchFamily="2" charset="0"/>
+                <a:ea typeface="Calibri" panose="020F0502020204030204" pitchFamily="34" charset="0"/>
+                <a:cs typeface="Symbol" panose="05050102010706020507" pitchFamily="18" charset="2"/>
+              </a:rPr>
+              <a:t>My MVP is the staff side of the IMS, but I know adding the customer side would add another layer of functionality.</a:t>
+            </a:r>
+          </a:p>
+          <a:p>
+            <a:r>
+              <a:rPr lang="en-GB" sz="1800" dirty="0">
+                <a:solidFill>
+                  <a:srgbClr val="2E2D2C"/>
+                </a:solidFill>
+                <a:effectLst/>
+                <a:latin typeface="Montserrat Light" panose="00000400000000000000" pitchFamily="2" charset="0"/>
+                <a:ea typeface="Calibri" panose="020F0502020204030204" pitchFamily="34" charset="0"/>
+                <a:cs typeface="Symbol" panose="05050102010706020507" pitchFamily="18" charset="2"/>
+              </a:rPr>
+              <a:t>- Broke all the task</a:t>
+            </a:r>
+            <a:r>
+              <a:rPr lang="en-GB" sz="1800" dirty="0">
+                <a:solidFill>
+                  <a:srgbClr val="2E2D2C"/>
+                </a:solidFill>
+                <a:latin typeface="Montserrat Light" panose="00000400000000000000" pitchFamily="2" charset="0"/>
+                <a:ea typeface="Calibri" panose="020F0502020204030204" pitchFamily="34" charset="0"/>
+                <a:cs typeface="Symbol" panose="05050102010706020507" pitchFamily="18" charset="2"/>
+              </a:rPr>
+              <a:t>s down necessary to do this in a Jira board, and organised into sprints based on story point estimates. Broken down into smaller tasks with story points of below 5.</a:t>
+            </a:r>
             <a:endParaRPr lang="en-GB" sz="1800" dirty="0">
               <a:solidFill>
                 <a:srgbClr val="2E2D2C"/>
@@ -5058,6 +5213,87 @@
                 <a:cs typeface="Segoe UI" panose="020B0502040204020203" pitchFamily="34" charset="0"/>
               </a:rPr>
               <a:t>What did you complete? What got left behind?</a:t>
+            </a:r>
+          </a:p>
+          <a:p>
+            <a:endParaRPr lang="en-GB" sz="1800" dirty="0">
+              <a:solidFill>
+                <a:srgbClr val="2E2D2C"/>
+              </a:solidFill>
+              <a:latin typeface="Montserrat Light" panose="00000400000000000000" pitchFamily="2" charset="0"/>
+              <a:cs typeface="Segoe UI" panose="020B0502040204020203" pitchFamily="34" charset="0"/>
+            </a:endParaRPr>
+          </a:p>
+          <a:p>
+            <a:r>
+              <a:rPr lang="en-GB" sz="1800" dirty="0">
+                <a:solidFill>
+                  <a:srgbClr val="2E2D2C"/>
+                </a:solidFill>
+                <a:latin typeface="Montserrat Light" panose="00000400000000000000" pitchFamily="2" charset="0"/>
+                <a:cs typeface="Segoe UI" panose="020B0502040204020203" pitchFamily="34" charset="0"/>
+              </a:rPr>
+              <a:t>Sprint 0 – Completed initial documentation, Jira board and created database tables</a:t>
+            </a:r>
+          </a:p>
+          <a:p>
+            <a:r>
+              <a:rPr lang="en-GB" sz="1800" dirty="0">
+                <a:solidFill>
+                  <a:srgbClr val="2E2D2C"/>
+                </a:solidFill>
+                <a:latin typeface="Montserrat Light" panose="00000400000000000000" pitchFamily="2" charset="0"/>
+                <a:cs typeface="Segoe UI" panose="020B0502040204020203" pitchFamily="34" charset="0"/>
+              </a:rPr>
+              <a:t>Sprint 1 –</a:t>
+            </a:r>
+          </a:p>
+          <a:p>
+            <a:r>
+              <a:rPr lang="en-GB" sz="1800" dirty="0">
+                <a:solidFill>
+                  <a:srgbClr val="2E2D2C"/>
+                </a:solidFill>
+                <a:latin typeface="Montserrat Light" panose="00000400000000000000" pitchFamily="2" charset="0"/>
+                <a:cs typeface="Segoe UI" panose="020B0502040204020203" pitchFamily="34" charset="0"/>
+              </a:rPr>
+              <a:t>Sprint 2 –</a:t>
+            </a:r>
+          </a:p>
+          <a:p>
+            <a:r>
+              <a:rPr lang="en-GB" sz="1800" dirty="0">
+                <a:solidFill>
+                  <a:srgbClr val="2E2D2C"/>
+                </a:solidFill>
+                <a:latin typeface="Montserrat Light" panose="00000400000000000000" pitchFamily="2" charset="0"/>
+                <a:cs typeface="Segoe UI" panose="020B0502040204020203" pitchFamily="34" charset="0"/>
+              </a:rPr>
+              <a:t>Sprint 3 –</a:t>
+            </a:r>
+          </a:p>
+          <a:p>
+            <a:r>
+              <a:rPr lang="en-GB" sz="1800" dirty="0">
+                <a:solidFill>
+                  <a:srgbClr val="2E2D2C"/>
+                </a:solidFill>
+                <a:latin typeface="Montserrat Light" panose="00000400000000000000" pitchFamily="2" charset="0"/>
+                <a:cs typeface="Segoe UI" panose="020B0502040204020203" pitchFamily="34" charset="0"/>
+              </a:rPr>
+              <a:t>Sprint 4 –</a:t>
+            </a:r>
+          </a:p>
+          <a:p>
+            <a:r>
+              <a:rPr lang="en-GB" sz="1800" dirty="0">
+                <a:solidFill>
+                  <a:srgbClr val="2E2D2C"/>
+                </a:solidFill>
+                <a:latin typeface="Montserrat Light" panose="00000400000000000000" pitchFamily="2" charset="0"/>
+                <a:cs typeface="Segoe UI" panose="020B0502040204020203" pitchFamily="34" charset="0"/>
+              </a:rPr>
+              <a:t>Sprint 5 -</a:t>
             </a:r>
             <a:endParaRPr lang="en-GB" dirty="0"/>
           </a:p>

</xml_diff>

<commit_message>
Updating risk assessment, diagrams
</commit_message>
<xml_diff>
--- a/documentation/Fundamental Project (IMS) Presentation.pptx
+++ b/documentation/Fundamental Project (IMS) Presentation.pptx
@@ -7,16 +7,17 @@
   <p:sldIdLst>
     <p:sldId id="256" r:id="rId2"/>
     <p:sldId id="257" r:id="rId3"/>
-    <p:sldId id="258" r:id="rId4"/>
-    <p:sldId id="259" r:id="rId5"/>
-    <p:sldId id="260" r:id="rId6"/>
-    <p:sldId id="261" r:id="rId7"/>
-    <p:sldId id="262" r:id="rId8"/>
-    <p:sldId id="263" r:id="rId9"/>
-    <p:sldId id="264" r:id="rId10"/>
-    <p:sldId id="265" r:id="rId11"/>
-    <p:sldId id="266" r:id="rId12"/>
-    <p:sldId id="267" r:id="rId13"/>
+    <p:sldId id="268" r:id="rId4"/>
+    <p:sldId id="258" r:id="rId5"/>
+    <p:sldId id="259" r:id="rId6"/>
+    <p:sldId id="260" r:id="rId7"/>
+    <p:sldId id="261" r:id="rId8"/>
+    <p:sldId id="262" r:id="rId9"/>
+    <p:sldId id="263" r:id="rId10"/>
+    <p:sldId id="264" r:id="rId11"/>
+    <p:sldId id="265" r:id="rId12"/>
+    <p:sldId id="266" r:id="rId13"/>
+    <p:sldId id="267" r:id="rId14"/>
   </p:sldIdLst>
   <p:sldSz cx="12192000" cy="6858000"/>
   <p:notesSz cx="6858000" cy="9144000"/>
@@ -367,7 +368,7 @@
           <a:p>
             <a:fld id="{9184DA70-C731-4C70-880D-CCD4705E623C}" type="datetime1">
               <a:rPr lang="en-US" smtClean="0"/>
-              <a:t>8/22/2022</a:t>
+              <a:t>8/25/2022</a:t>
             </a:fld>
             <a:endParaRPr lang="en-US" dirty="0"/>
           </a:p>
@@ -555,7 +556,7 @@
           <a:p>
             <a:fld id="{B612A279-0833-481D-8C56-F67FD0AC6C50}" type="datetime1">
               <a:rPr lang="en-US" smtClean="0"/>
-              <a:t>8/22/2022</a:t>
+              <a:t>8/25/2022</a:t>
             </a:fld>
             <a:endParaRPr lang="en-US" dirty="0"/>
           </a:p>
@@ -797,7 +798,7 @@
           <a:p>
             <a:fld id="{6587DA83-5663-4C9C-B9AA-0B40A3DAFF81}" type="datetime1">
               <a:rPr lang="en-US" smtClean="0"/>
-              <a:t>8/22/2022</a:t>
+              <a:t>8/25/2022</a:t>
             </a:fld>
             <a:endParaRPr lang="en-US" dirty="0"/>
           </a:p>
@@ -985,7 +986,7 @@
           <a:p>
             <a:fld id="{4BE1D723-8F53-4F53-90B0-1982A396982E}" type="datetime1">
               <a:rPr lang="en-US" smtClean="0"/>
-              <a:t>8/22/2022</a:t>
+              <a:t>8/25/2022</a:t>
             </a:fld>
             <a:endParaRPr lang="en-US" dirty="0"/>
           </a:p>
@@ -1358,7 +1359,7 @@
           <a:p>
             <a:fld id="{97669AF7-7BEB-44E4-9852-375E34362B5B}" type="datetime1">
               <a:rPr lang="en-US" smtClean="0"/>
-              <a:t>8/22/2022</a:t>
+              <a:t>8/25/2022</a:t>
             </a:fld>
             <a:endParaRPr lang="en-US" dirty="0"/>
           </a:p>
@@ -1613,7 +1614,7 @@
           <a:p>
             <a:fld id="{BAAAC38D-0552-4C82-B593-E6124DFADBE2}" type="datetime1">
               <a:rPr lang="en-US" smtClean="0"/>
-              <a:t>8/22/2022</a:t>
+              <a:t>8/25/2022</a:t>
             </a:fld>
             <a:endParaRPr lang="en-US" dirty="0"/>
           </a:p>
@@ -2010,7 +2011,7 @@
           <a:p>
             <a:fld id="{D9DF0F1C-5577-4ACB-BB62-DF8F3C494C7E}" type="datetime1">
               <a:rPr lang="en-US" smtClean="0"/>
-              <a:t>8/22/2022</a:t>
+              <a:t>8/25/2022</a:t>
             </a:fld>
             <a:endParaRPr lang="en-US" dirty="0"/>
           </a:p>
@@ -2146,7 +2147,7 @@
           <a:p>
             <a:fld id="{1775B394-D9F9-4F0C-B15D-605F45CB9E9F}" type="datetime1">
               <a:rPr lang="en-US" smtClean="0"/>
-              <a:t>8/22/2022</a:t>
+              <a:t>8/25/2022</a:t>
             </a:fld>
             <a:endParaRPr lang="en-US" dirty="0"/>
           </a:p>
@@ -2303,7 +2304,7 @@
           <a:p>
             <a:fld id="{39667345-2558-425A-8533-9BFDBCE15005}" type="datetime1">
               <a:rPr lang="en-US" smtClean="0"/>
-              <a:t>8/22/2022</a:t>
+              <a:t>8/25/2022</a:t>
             </a:fld>
             <a:endParaRPr lang="en-US" dirty="0"/>
           </a:p>
@@ -2632,7 +2633,7 @@
           <a:p>
             <a:fld id="{92BEA474-078D-4E9B-9B14-09A87B19DC46}" type="datetime1">
               <a:rPr lang="en-US" smtClean="0"/>
-              <a:t>8/22/2022</a:t>
+              <a:t>8/25/2022</a:t>
             </a:fld>
             <a:endParaRPr lang="en-US" dirty="0"/>
           </a:p>
@@ -2982,7 +2983,7 @@
           <a:p>
             <a:fld id="{4907D986-8816-4272-A432-0437A28A9828}" type="datetime1">
               <a:rPr lang="en-US" smtClean="0"/>
-              <a:t>8/22/2022</a:t>
+              <a:t>8/25/2022</a:t>
             </a:fld>
             <a:endParaRPr lang="en-US" dirty="0"/>
           </a:p>
@@ -3243,7 +3244,7 @@
           <a:p>
             <a:fld id="{62D6E202-B606-4609-B914-27C9371A1F6D}" type="datetime1">
               <a:rPr lang="en-US" smtClean="0"/>
-              <a:t>8/22/2022</a:t>
+              <a:t>8/25/2022</a:t>
             </a:fld>
             <a:endParaRPr lang="en-US" dirty="0"/>
           </a:p>
@@ -3863,8 +3864,8 @@
           <a:lstStyle/>
           <a:p>
             <a:r>
-              <a:rPr lang="en-GB" sz="6800"/>
-              <a:t>Fundamental Project (IMS)</a:t>
+              <a:rPr lang="en-GB" sz="6800" dirty="0"/>
+              <a:t>IMS for an online bar service</a:t>
             </a:r>
           </a:p>
         </p:txBody>
@@ -4023,7 +4024,7 @@
           <p:cNvPr id="2" name="Title 1">
             <a:extLst>
               <a:ext uri="{FF2B5EF4-FFF2-40B4-BE49-F238E27FC236}">
-                <a16:creationId xmlns:a16="http://schemas.microsoft.com/office/drawing/2014/main" id="{2B2776A0-3285-7565-DD46-2DC79219949D}"/>
+                <a16:creationId xmlns:a16="http://schemas.microsoft.com/office/drawing/2014/main" id="{2412AD8D-FCE1-FB4F-5DC5-00988D77EA0E}"/>
               </a:ext>
             </a:extLst>
           </p:cNvPr>
@@ -4036,12 +4037,14 @@
         </p:nvSpPr>
         <p:spPr/>
         <p:txBody>
-          <a:bodyPr/>
+          <a:bodyPr>
+            <a:normAutofit/>
+          </a:bodyPr>
           <a:lstStyle/>
           <a:p>
             <a:r>
               <a:rPr lang="en-GB" dirty="0"/>
-              <a:t>Sprint Retrospective</a:t>
+              <a:t>Sprint Review</a:t>
             </a:r>
           </a:p>
         </p:txBody>
@@ -4051,7 +4054,7 @@
           <p:cNvPr id="3" name="Content Placeholder 2">
             <a:extLst>
               <a:ext uri="{FF2B5EF4-FFF2-40B4-BE49-F238E27FC236}">
-                <a16:creationId xmlns:a16="http://schemas.microsoft.com/office/drawing/2014/main" id="{4D8CB634-A5C4-4A20-6D76-B6CB948D5791}"/>
+                <a16:creationId xmlns:a16="http://schemas.microsoft.com/office/drawing/2014/main" id="{2690E234-7B9C-A718-1EF8-F1EFF9A1423E}"/>
               </a:ext>
             </a:extLst>
           </p:cNvPr>
@@ -4064,9 +4067,7 @@
         </p:nvSpPr>
         <p:spPr/>
         <p:txBody>
-          <a:bodyPr>
-            <a:normAutofit lnSpcReduction="10000"/>
-          </a:bodyPr>
+          <a:bodyPr/>
           <a:lstStyle/>
           <a:p>
             <a:r>
@@ -4077,9 +4078,9 @@
                 <a:effectLst/>
                 <a:latin typeface="Montserrat Light" panose="00000400000000000000" pitchFamily="2" charset="0"/>
                 <a:ea typeface="Calibri" panose="020F0502020204030204" pitchFamily="34" charset="0"/>
-                <a:cs typeface="Symbol" panose="05050102010706020507" pitchFamily="18" charset="2"/>
+                <a:cs typeface="Segoe UI" panose="020B0502040204020203" pitchFamily="34" charset="0"/>
               </a:rPr>
-              <a:t>What went well? What could be improved?</a:t>
+              <a:t>What did you complete? What got left behind?</a:t>
             </a:r>
           </a:p>
           <a:p>
@@ -4088,8 +4089,7 @@
                 <a:srgbClr val="2E2D2C"/>
               </a:solidFill>
               <a:latin typeface="Montserrat Light" panose="00000400000000000000" pitchFamily="2" charset="0"/>
-              <a:ea typeface="Calibri" panose="020F0502020204030204" pitchFamily="34" charset="0"/>
-              <a:cs typeface="Symbol" panose="05050102010706020507" pitchFamily="18" charset="2"/>
+              <a:cs typeface="Segoe UI" panose="020B0502040204020203" pitchFamily="34" charset="0"/>
             </a:endParaRPr>
           </a:p>
           <a:p>
@@ -4101,7 +4101,7 @@
                 <a:latin typeface="Montserrat Light" panose="00000400000000000000" pitchFamily="2" charset="0"/>
                 <a:cs typeface="Segoe UI" panose="020B0502040204020203" pitchFamily="34" charset="0"/>
               </a:rPr>
-              <a:t>Sprint 0 – Created detailed epics, stories, tasks and acceptance criteria. However risk assessment is not yet complete and is going to be updated as the project goes on.</a:t>
+              <a:t>Sprint 0 – Completed initial documentation, Jira board and created database tables</a:t>
             </a:r>
           </a:p>
           <a:p>
@@ -4163,20 +4163,6 @@
               </a:rPr>
               <a:t>Sprint 5 -</a:t>
             </a:r>
-            <a:endParaRPr lang="en-GB" sz="1800" dirty="0"/>
-          </a:p>
-          <a:p>
-            <a:endParaRPr lang="en-GB" sz="1800" dirty="0">
-              <a:solidFill>
-                <a:srgbClr val="2E2D2C"/>
-              </a:solidFill>
-              <a:effectLst/>
-              <a:latin typeface="Segoe UI" panose="020B0502040204020203" pitchFamily="34" charset="0"/>
-              <a:ea typeface="Calibri" panose="020F0502020204030204" pitchFamily="34" charset="0"/>
-              <a:cs typeface="Symbol" panose="05050102010706020507" pitchFamily="18" charset="2"/>
-            </a:endParaRPr>
-          </a:p>
-          <a:p>
             <a:endParaRPr lang="en-GB" dirty="0"/>
           </a:p>
         </p:txBody>
@@ -4184,7 +4170,7 @@
     </p:spTree>
     <p:extLst>
       <p:ext uri="{BB962C8B-B14F-4D97-AF65-F5344CB8AC3E}">
-        <p14:creationId xmlns:p14="http://schemas.microsoft.com/office/powerpoint/2010/main" val="280668787"/>
+        <p14:creationId xmlns:p14="http://schemas.microsoft.com/office/powerpoint/2010/main" val="1269700073"/>
       </p:ext>
     </p:extLst>
   </p:cSld>
@@ -4216,6 +4202,199 @@
           <p:cNvPr id="2" name="Title 1">
             <a:extLst>
               <a:ext uri="{FF2B5EF4-FFF2-40B4-BE49-F238E27FC236}">
+                <a16:creationId xmlns:a16="http://schemas.microsoft.com/office/drawing/2014/main" id="{2B2776A0-3285-7565-DD46-2DC79219949D}"/>
+              </a:ext>
+            </a:extLst>
+          </p:cNvPr>
+          <p:cNvSpPr>
+            <a:spLocks noGrp="1"/>
+          </p:cNvSpPr>
+          <p:nvPr>
+            <p:ph type="title"/>
+          </p:nvPr>
+        </p:nvSpPr>
+        <p:spPr/>
+        <p:txBody>
+          <a:bodyPr/>
+          <a:lstStyle/>
+          <a:p>
+            <a:r>
+              <a:rPr lang="en-GB" dirty="0"/>
+              <a:t>Sprint Retrospective</a:t>
+            </a:r>
+          </a:p>
+        </p:txBody>
+      </p:sp>
+      <p:sp>
+        <p:nvSpPr>
+          <p:cNvPr id="3" name="Content Placeholder 2">
+            <a:extLst>
+              <a:ext uri="{FF2B5EF4-FFF2-40B4-BE49-F238E27FC236}">
+                <a16:creationId xmlns:a16="http://schemas.microsoft.com/office/drawing/2014/main" id="{4D8CB634-A5C4-4A20-6D76-B6CB948D5791}"/>
+              </a:ext>
+            </a:extLst>
+          </p:cNvPr>
+          <p:cNvSpPr>
+            <a:spLocks noGrp="1"/>
+          </p:cNvSpPr>
+          <p:nvPr>
+            <p:ph idx="1"/>
+          </p:nvPr>
+        </p:nvSpPr>
+        <p:spPr/>
+        <p:txBody>
+          <a:bodyPr>
+            <a:normAutofit lnSpcReduction="10000"/>
+          </a:bodyPr>
+          <a:lstStyle/>
+          <a:p>
+            <a:r>
+              <a:rPr lang="en-GB" sz="1800" dirty="0">
+                <a:solidFill>
+                  <a:srgbClr val="2E2D2C"/>
+                </a:solidFill>
+                <a:effectLst/>
+                <a:latin typeface="Montserrat Light" panose="00000400000000000000" pitchFamily="2" charset="0"/>
+                <a:ea typeface="Calibri" panose="020F0502020204030204" pitchFamily="34" charset="0"/>
+                <a:cs typeface="Symbol" panose="05050102010706020507" pitchFamily="18" charset="2"/>
+              </a:rPr>
+              <a:t>What went well? What could be improved?</a:t>
+            </a:r>
+          </a:p>
+          <a:p>
+            <a:endParaRPr lang="en-GB" sz="1800" dirty="0">
+              <a:solidFill>
+                <a:srgbClr val="2E2D2C"/>
+              </a:solidFill>
+              <a:latin typeface="Montserrat Light" panose="00000400000000000000" pitchFamily="2" charset="0"/>
+              <a:ea typeface="Calibri" panose="020F0502020204030204" pitchFamily="34" charset="0"/>
+              <a:cs typeface="Symbol" panose="05050102010706020507" pitchFamily="18" charset="2"/>
+            </a:endParaRPr>
+          </a:p>
+          <a:p>
+            <a:r>
+              <a:rPr lang="en-GB" sz="1800" dirty="0">
+                <a:solidFill>
+                  <a:srgbClr val="2E2D2C"/>
+                </a:solidFill>
+                <a:latin typeface="Montserrat Light" panose="00000400000000000000" pitchFamily="2" charset="0"/>
+                <a:cs typeface="Segoe UI" panose="020B0502040204020203" pitchFamily="34" charset="0"/>
+              </a:rPr>
+              <a:t>Sprint 0 – Created detailed epics, stories, tasks and acceptance criteria. However risk assessment is not yet complete and is going to be updated as the project goes on.</a:t>
+            </a:r>
+          </a:p>
+          <a:p>
+            <a:r>
+              <a:rPr lang="en-GB" sz="1800" dirty="0">
+                <a:solidFill>
+                  <a:srgbClr val="2E2D2C"/>
+                </a:solidFill>
+                <a:latin typeface="Montserrat Light" panose="00000400000000000000" pitchFamily="2" charset="0"/>
+                <a:cs typeface="Segoe UI" panose="020B0502040204020203" pitchFamily="34" charset="0"/>
+              </a:rPr>
+              <a:t>Sprint 1 –</a:t>
+            </a:r>
+          </a:p>
+          <a:p>
+            <a:r>
+              <a:rPr lang="en-GB" sz="1800" dirty="0">
+                <a:solidFill>
+                  <a:srgbClr val="2E2D2C"/>
+                </a:solidFill>
+                <a:latin typeface="Montserrat Light" panose="00000400000000000000" pitchFamily="2" charset="0"/>
+                <a:cs typeface="Segoe UI" panose="020B0502040204020203" pitchFamily="34" charset="0"/>
+              </a:rPr>
+              <a:t>Sprint 2 –</a:t>
+            </a:r>
+          </a:p>
+          <a:p>
+            <a:r>
+              <a:rPr lang="en-GB" sz="1800" dirty="0">
+                <a:solidFill>
+                  <a:srgbClr val="2E2D2C"/>
+                </a:solidFill>
+                <a:latin typeface="Montserrat Light" panose="00000400000000000000" pitchFamily="2" charset="0"/>
+                <a:cs typeface="Segoe UI" panose="020B0502040204020203" pitchFamily="34" charset="0"/>
+              </a:rPr>
+              <a:t>Sprint 3 –</a:t>
+            </a:r>
+          </a:p>
+          <a:p>
+            <a:r>
+              <a:rPr lang="en-GB" sz="1800" dirty="0">
+                <a:solidFill>
+                  <a:srgbClr val="2E2D2C"/>
+                </a:solidFill>
+                <a:latin typeface="Montserrat Light" panose="00000400000000000000" pitchFamily="2" charset="0"/>
+                <a:cs typeface="Segoe UI" panose="020B0502040204020203" pitchFamily="34" charset="0"/>
+              </a:rPr>
+              <a:t>Sprint 4 –</a:t>
+            </a:r>
+          </a:p>
+          <a:p>
+            <a:r>
+              <a:rPr lang="en-GB" sz="1800" dirty="0">
+                <a:solidFill>
+                  <a:srgbClr val="2E2D2C"/>
+                </a:solidFill>
+                <a:latin typeface="Montserrat Light" panose="00000400000000000000" pitchFamily="2" charset="0"/>
+                <a:cs typeface="Segoe UI" panose="020B0502040204020203" pitchFamily="34" charset="0"/>
+              </a:rPr>
+              <a:t>Sprint 5 -</a:t>
+            </a:r>
+            <a:endParaRPr lang="en-GB" sz="1800" dirty="0"/>
+          </a:p>
+          <a:p>
+            <a:endParaRPr lang="en-GB" sz="1800" dirty="0">
+              <a:solidFill>
+                <a:srgbClr val="2E2D2C"/>
+              </a:solidFill>
+              <a:effectLst/>
+              <a:latin typeface="Segoe UI" panose="020B0502040204020203" pitchFamily="34" charset="0"/>
+              <a:ea typeface="Calibri" panose="020F0502020204030204" pitchFamily="34" charset="0"/>
+              <a:cs typeface="Symbol" panose="05050102010706020507" pitchFamily="18" charset="2"/>
+            </a:endParaRPr>
+          </a:p>
+          <a:p>
+            <a:endParaRPr lang="en-GB" dirty="0"/>
+          </a:p>
+        </p:txBody>
+      </p:sp>
+    </p:spTree>
+    <p:extLst>
+      <p:ext uri="{BB962C8B-B14F-4D97-AF65-F5344CB8AC3E}">
+        <p14:creationId xmlns:p14="http://schemas.microsoft.com/office/powerpoint/2010/main" val="280668787"/>
+      </p:ext>
+    </p:extLst>
+  </p:cSld>
+  <p:clrMapOvr>
+    <a:masterClrMapping/>
+  </p:clrMapOvr>
+</p:sld>
+</file>
+
+<file path=ppt/slides/slide12.xml><?xml version="1.0" encoding="utf-8"?>
+<p:sld xmlns:a="http://schemas.openxmlformats.org/drawingml/2006/main" xmlns:r="http://schemas.openxmlformats.org/officeDocument/2006/relationships" xmlns:p="http://schemas.openxmlformats.org/presentationml/2006/main">
+  <p:cSld>
+    <p:spTree>
+      <p:nvGrpSpPr>
+        <p:cNvPr id="1" name=""/>
+        <p:cNvGrpSpPr/>
+        <p:nvPr/>
+      </p:nvGrpSpPr>
+      <p:grpSpPr>
+        <a:xfrm>
+          <a:off x="0" y="0"/>
+          <a:ext cx="0" cy="0"/>
+          <a:chOff x="0" y="0"/>
+          <a:chExt cx="0" cy="0"/>
+        </a:xfrm>
+      </p:grpSpPr>
+      <p:sp>
+        <p:nvSpPr>
+          <p:cNvPr id="2" name="Title 1">
+            <a:extLst>
+              <a:ext uri="{FF2B5EF4-FFF2-40B4-BE49-F238E27FC236}">
                 <a16:creationId xmlns:a16="http://schemas.microsoft.com/office/drawing/2014/main" id="{C7E760D4-81B0-DDE6-BBAA-DB3F2964FEE9}"/>
               </a:ext>
             </a:extLst>
@@ -4279,7 +4458,7 @@
 </p:sld>
 </file>
 
-<file path=ppt/slides/slide12.xml><?xml version="1.0" encoding="utf-8"?>
+<file path=ppt/slides/slide13.xml><?xml version="1.0" encoding="utf-8"?>
 <p:sld xmlns:a="http://schemas.openxmlformats.org/drawingml/2006/main" xmlns:r="http://schemas.openxmlformats.org/officeDocument/2006/relationships" xmlns:p="http://schemas.openxmlformats.org/presentationml/2006/main">
   <p:cSld>
     <p:spTree>
@@ -4448,25 +4627,11 @@
                 <a:solidFill>
                   <a:srgbClr val="2E2D2C"/>
                 </a:solidFill>
-                <a:effectLst/>
                 <a:latin typeface="Montserrat Light" panose="00000400000000000000" pitchFamily="2" charset="0"/>
                 <a:ea typeface="Calibri" panose="020F0502020204030204" pitchFamily="34" charset="0"/>
                 <a:cs typeface="Symbol" panose="05050102010706020507" pitchFamily="18" charset="2"/>
               </a:rPr>
-              <a:t>Who are you? How did you approach the specification?</a:t>
-            </a:r>
-          </a:p>
-          <a:p>
-            <a:r>
-              <a:rPr lang="en-GB" sz="1800" dirty="0">
-                <a:solidFill>
-                  <a:srgbClr val="2E2D2C"/>
-                </a:solidFill>
-                <a:latin typeface="Montserrat Light" panose="00000400000000000000" pitchFamily="2" charset="0"/>
-                <a:ea typeface="Calibri" panose="020F0502020204030204" pitchFamily="34" charset="0"/>
-                <a:cs typeface="Symbol" panose="05050102010706020507" pitchFamily="18" charset="2"/>
-              </a:rPr>
-              <a:t>- First of all I broke my project idea into two sections: Customer and Staff</a:t>
+              <a:t>- First of all I broke the project into three main sections: Customers, Items and Orders.</a:t>
             </a:r>
           </a:p>
           <a:p>
@@ -4480,7 +4645,7 @@
                 <a:ea typeface="Calibri" panose="020F0502020204030204" pitchFamily="34" charset="0"/>
                 <a:cs typeface="Symbol" panose="05050102010706020507" pitchFamily="18" charset="2"/>
               </a:rPr>
-              <a:t>- </a:t>
+              <a:t>- Used this as my 3 epics for the project, associated them with user stories and then broke all the task</a:t>
             </a:r>
             <a:r>
               <a:rPr lang="en-GB" sz="1800" dirty="0">
@@ -4491,32 +4656,7 @@
                 <a:ea typeface="Calibri" panose="020F0502020204030204" pitchFamily="34" charset="0"/>
                 <a:cs typeface="Symbol" panose="05050102010706020507" pitchFamily="18" charset="2"/>
               </a:rPr>
-              <a:t>My MVP is the staff side of the IMS, but I know adding the customer side would add another layer of functionality.</a:t>
-            </a:r>
-          </a:p>
-          <a:p>
-            <a:r>
-              <a:rPr lang="en-GB" sz="1800" dirty="0">
-                <a:solidFill>
-                  <a:srgbClr val="2E2D2C"/>
-                </a:solidFill>
-                <a:effectLst/>
-                <a:latin typeface="Montserrat Light" panose="00000400000000000000" pitchFamily="2" charset="0"/>
-                <a:ea typeface="Calibri" panose="020F0502020204030204" pitchFamily="34" charset="0"/>
-                <a:cs typeface="Symbol" panose="05050102010706020507" pitchFamily="18" charset="2"/>
-              </a:rPr>
-              <a:t>- Broke all the task</a:t>
-            </a:r>
-            <a:r>
-              <a:rPr lang="en-GB" sz="1800" dirty="0">
-                <a:solidFill>
-                  <a:srgbClr val="2E2D2C"/>
-                </a:solidFill>
-                <a:latin typeface="Montserrat Light" panose="00000400000000000000" pitchFamily="2" charset="0"/>
-                <a:ea typeface="Calibri" panose="020F0502020204030204" pitchFamily="34" charset="0"/>
-                <a:cs typeface="Symbol" panose="05050102010706020507" pitchFamily="18" charset="2"/>
-              </a:rPr>
-              <a:t>s down necessary to do this in a Jira board, and organised into sprints based on story point estimates. Broken down into smaller tasks with story points of below 5.</a:t>
+              <a:t>s down necessary to do this in a Jira board, and organised them into sprints based on story point estimates. </a:t>
             </a:r>
             <a:endParaRPr lang="en-GB" sz="1800" dirty="0">
               <a:solidFill>
@@ -4533,6 +4673,41 @@
           </a:p>
         </p:txBody>
       </p:sp>
+      <p:pic>
+        <p:nvPicPr>
+          <p:cNvPr id="5" name="Picture 4" descr="Table, Teams&#10;&#10;Description automatically generated">
+            <a:extLst>
+              <a:ext uri="{FF2B5EF4-FFF2-40B4-BE49-F238E27FC236}">
+                <a16:creationId xmlns:a16="http://schemas.microsoft.com/office/drawing/2014/main" id="{50130FFC-94D0-C7B9-2705-A013E064AB30}"/>
+              </a:ext>
+            </a:extLst>
+          </p:cNvPr>
+          <p:cNvPicPr>
+            <a:picLocks noChangeAspect="1"/>
+          </p:cNvPicPr>
+          <p:nvPr/>
+        </p:nvPicPr>
+        <p:blipFill rotWithShape="1">
+          <a:blip r:embed="rId2">
+            <a:extLst>
+              <a:ext uri="{28A0092B-C50C-407E-A947-70E740481C1C}">
+                <a14:useLocalDpi xmlns:a14="http://schemas.microsoft.com/office/drawing/2010/main" val="0"/>
+              </a:ext>
+            </a:extLst>
+          </a:blip>
+          <a:srcRect b="6806"/>
+          <a:stretch/>
+        </p:blipFill>
+        <p:spPr>
+          <a:xfrm>
+            <a:off x="2794000" y="3693405"/>
+            <a:ext cx="6128384" cy="2453395"/>
+          </a:xfrm>
+          <a:prstGeom prst="rect">
+            <a:avLst/>
+          </a:prstGeom>
+        </p:spPr>
+      </p:pic>
     </p:spTree>
     <p:extLst>
       <p:ext uri="{BB962C8B-B14F-4D97-AF65-F5344CB8AC3E}">
@@ -4568,7 +4743,7 @@
           <p:cNvPr id="2" name="Title 1">
             <a:extLst>
               <a:ext uri="{FF2B5EF4-FFF2-40B4-BE49-F238E27FC236}">
-                <a16:creationId xmlns:a16="http://schemas.microsoft.com/office/drawing/2014/main" id="{C127007C-0E1E-F23E-45F0-9BFD0B2A5C27}"/>
+                <a16:creationId xmlns:a16="http://schemas.microsoft.com/office/drawing/2014/main" id="{BBC672B1-8BE8-4962-EDC1-AACB3DB69803}"/>
               </a:ext>
             </a:extLst>
           </p:cNvPr>
@@ -4586,7 +4761,7 @@
           <a:p>
             <a:r>
               <a:rPr lang="en-GB" dirty="0"/>
-              <a:t>Consultant Journey</a:t>
+              <a:t>Introduction</a:t>
             </a:r>
           </a:p>
         </p:txBody>
@@ -4596,7 +4771,7 @@
           <p:cNvPr id="3" name="Content Placeholder 2">
             <a:extLst>
               <a:ext uri="{FF2B5EF4-FFF2-40B4-BE49-F238E27FC236}">
-                <a16:creationId xmlns:a16="http://schemas.microsoft.com/office/drawing/2014/main" id="{D6C73B40-B430-3E48-B3D3-5204A4014903}"/>
+                <a16:creationId xmlns:a16="http://schemas.microsoft.com/office/drawing/2014/main" id="{AC83B351-DD9F-7B7B-A4DC-6E370AFFC406}"/>
               </a:ext>
             </a:extLst>
           </p:cNvPr>
@@ -4613,26 +4788,15 @@
           <a:lstStyle/>
           <a:p>
             <a:r>
-              <a:rPr lang="en-GB" sz="1800" dirty="0">
-                <a:solidFill>
-                  <a:srgbClr val="2E2D2C"/>
-                </a:solidFill>
-                <a:effectLst/>
-                <a:latin typeface="Montserrat Light" panose="00000400000000000000" pitchFamily="2" charset="0"/>
-                <a:ea typeface="Calibri" panose="020F0502020204030204" pitchFamily="34" charset="0"/>
-                <a:cs typeface="Symbol" panose="05050102010706020507" pitchFamily="18" charset="2"/>
-              </a:rPr>
-              <a:t>What technologies have you learned for this project?</a:t>
-            </a:r>
-            <a:endParaRPr lang="en-GB" sz="1800" dirty="0">
-              <a:solidFill>
-                <a:srgbClr val="2E2D2C"/>
-              </a:solidFill>
-              <a:effectLst/>
-              <a:latin typeface="Segoe UI" panose="020B0502040204020203" pitchFamily="34" charset="0"/>
-              <a:ea typeface="Calibri" panose="020F0502020204030204" pitchFamily="34" charset="0"/>
-              <a:cs typeface="Symbol" panose="05050102010706020507" pitchFamily="18" charset="2"/>
-            </a:endParaRPr>
+              <a:rPr lang="en-GB" dirty="0"/>
+              <a:t>- I knew items would take a similar format to customers, but orders would be more complicate due to the many to many relationship, so we have to keep track of not just the orders but the items in the orders too</a:t>
+            </a:r>
+          </a:p>
+          <a:p>
+            <a:r>
+              <a:rPr lang="en-GB" dirty="0"/>
+              <a:t>- So I began by creating my SQL schema and initial data, choosing the context of an online bar service, so customers could make orders and staff could keep track of them.</a:t>
+            </a:r>
           </a:p>
           <a:p>
             <a:endParaRPr lang="en-GB" dirty="0"/>
@@ -4642,7 +4806,7 @@
     </p:spTree>
     <p:extLst>
       <p:ext uri="{BB962C8B-B14F-4D97-AF65-F5344CB8AC3E}">
-        <p14:creationId xmlns:p14="http://schemas.microsoft.com/office/powerpoint/2010/main" val="3075287450"/>
+        <p14:creationId xmlns:p14="http://schemas.microsoft.com/office/powerpoint/2010/main" val="1033641389"/>
       </p:ext>
     </p:extLst>
   </p:cSld>
@@ -4674,7 +4838,7 @@
           <p:cNvPr id="2" name="Title 1">
             <a:extLst>
               <a:ext uri="{FF2B5EF4-FFF2-40B4-BE49-F238E27FC236}">
-                <a16:creationId xmlns:a16="http://schemas.microsoft.com/office/drawing/2014/main" id="{FB9980FB-B3B4-F439-8CD6-26302A73BED1}"/>
+                <a16:creationId xmlns:a16="http://schemas.microsoft.com/office/drawing/2014/main" id="{C127007C-0E1E-F23E-45F0-9BFD0B2A5C27}"/>
               </a:ext>
             </a:extLst>
           </p:cNvPr>
@@ -4692,7 +4856,7 @@
           <a:p>
             <a:r>
               <a:rPr lang="en-GB" dirty="0"/>
-              <a:t>CI</a:t>
+              <a:t>Consultant Journey</a:t>
             </a:r>
           </a:p>
         </p:txBody>
@@ -4702,7 +4866,7 @@
           <p:cNvPr id="3" name="Content Placeholder 2">
             <a:extLst>
               <a:ext uri="{FF2B5EF4-FFF2-40B4-BE49-F238E27FC236}">
-                <a16:creationId xmlns:a16="http://schemas.microsoft.com/office/drawing/2014/main" id="{EDCC12A3-0127-37F6-F2CA-024D243A4623}"/>
+                <a16:creationId xmlns:a16="http://schemas.microsoft.com/office/drawing/2014/main" id="{D6C73B40-B430-3E48-B3D3-5204A4014903}"/>
               </a:ext>
             </a:extLst>
           </p:cNvPr>
@@ -4726,10 +4890,45 @@
                 <a:effectLst/>
                 <a:latin typeface="Montserrat Light" panose="00000400000000000000" pitchFamily="2" charset="0"/>
                 <a:ea typeface="Calibri" panose="020F0502020204030204" pitchFamily="34" charset="0"/>
-                <a:cs typeface="Segoe UI" panose="020B0502040204020203" pitchFamily="34" charset="0"/>
+                <a:cs typeface="Symbol" panose="05050102010706020507" pitchFamily="18" charset="2"/>
               </a:rPr>
-              <a:t>How did you approach version control?</a:t>
-            </a:r>
+              <a:t>What technologies have you learned for this project?</a:t>
+            </a:r>
+          </a:p>
+          <a:p>
+            <a:endParaRPr lang="en-GB" sz="1800" dirty="0">
+              <a:solidFill>
+                <a:srgbClr val="2E2D2C"/>
+              </a:solidFill>
+              <a:latin typeface="Montserrat Light" panose="00000400000000000000" pitchFamily="2" charset="0"/>
+              <a:ea typeface="Calibri" panose="020F0502020204030204" pitchFamily="34" charset="0"/>
+              <a:cs typeface="Symbol" panose="05050102010706020507" pitchFamily="18" charset="2"/>
+            </a:endParaRPr>
+          </a:p>
+          <a:p>
+            <a:r>
+              <a:rPr lang="en-GB" sz="1800" dirty="0">
+                <a:solidFill>
+                  <a:srgbClr val="2E2D2C"/>
+                </a:solidFill>
+                <a:effectLst/>
+                <a:latin typeface="Montserrat Light" panose="00000400000000000000" pitchFamily="2" charset="0"/>
+                <a:ea typeface="Calibri" panose="020F0502020204030204" pitchFamily="34" charset="0"/>
+                <a:cs typeface="Symbol" panose="05050102010706020507" pitchFamily="18" charset="2"/>
+              </a:rPr>
+              <a:t>- This project uses Java, SQL,  GitHub and JUnit</a:t>
+            </a:r>
+            <a:endParaRPr lang="en-GB" sz="1800" dirty="0">
+              <a:solidFill>
+                <a:srgbClr val="2E2D2C"/>
+              </a:solidFill>
+              <a:effectLst/>
+              <a:latin typeface="Segoe UI" panose="020B0502040204020203" pitchFamily="34" charset="0"/>
+              <a:ea typeface="Calibri" panose="020F0502020204030204" pitchFamily="34" charset="0"/>
+              <a:cs typeface="Symbol" panose="05050102010706020507" pitchFamily="18" charset="2"/>
+            </a:endParaRPr>
+          </a:p>
+          <a:p>
             <a:endParaRPr lang="en-GB" dirty="0"/>
           </a:p>
         </p:txBody>
@@ -4737,7 +4936,7 @@
     </p:spTree>
     <p:extLst>
       <p:ext uri="{BB962C8B-B14F-4D97-AF65-F5344CB8AC3E}">
-        <p14:creationId xmlns:p14="http://schemas.microsoft.com/office/powerpoint/2010/main" val="1034101387"/>
+        <p14:creationId xmlns:p14="http://schemas.microsoft.com/office/powerpoint/2010/main" val="3075287450"/>
       </p:ext>
     </p:extLst>
   </p:cSld>
@@ -4769,7 +4968,7 @@
           <p:cNvPr id="2" name="Title 1">
             <a:extLst>
               <a:ext uri="{FF2B5EF4-FFF2-40B4-BE49-F238E27FC236}">
-                <a16:creationId xmlns:a16="http://schemas.microsoft.com/office/drawing/2014/main" id="{6D050264-48EB-031E-A16C-065D4A8A0174}"/>
+                <a16:creationId xmlns:a16="http://schemas.microsoft.com/office/drawing/2014/main" id="{FB9980FB-B3B4-F439-8CD6-26302A73BED1}"/>
               </a:ext>
             </a:extLst>
           </p:cNvPr>
@@ -4787,7 +4986,7 @@
           <a:p>
             <a:r>
               <a:rPr lang="en-GB" dirty="0"/>
-              <a:t>Testing</a:t>
+              <a:t>CI</a:t>
             </a:r>
           </a:p>
         </p:txBody>
@@ -4797,7 +4996,7 @@
           <p:cNvPr id="3" name="Content Placeholder 2">
             <a:extLst>
               <a:ext uri="{FF2B5EF4-FFF2-40B4-BE49-F238E27FC236}">
-                <a16:creationId xmlns:a16="http://schemas.microsoft.com/office/drawing/2014/main" id="{65D8B2F5-1A48-3482-10B7-6754AE0F624C}"/>
+                <a16:creationId xmlns:a16="http://schemas.microsoft.com/office/drawing/2014/main" id="{EDCC12A3-0127-37F6-F2CA-024D243A4623}"/>
               </a:ext>
             </a:extLst>
           </p:cNvPr>
@@ -4823,43 +5022,7 @@
                 <a:ea typeface="Calibri" panose="020F0502020204030204" pitchFamily="34" charset="0"/>
                 <a:cs typeface="Segoe UI" panose="020B0502040204020203" pitchFamily="34" charset="0"/>
               </a:rPr>
-              <a:t>What was tested? Show the coverage of the </a:t>
-            </a:r>
-            <a:r>
-              <a:rPr lang="en-GB" sz="1800" b="1" dirty="0" err="1">
-                <a:solidFill>
-                  <a:srgbClr val="2E2D2C"/>
-                </a:solidFill>
-                <a:effectLst/>
-                <a:latin typeface="Montserrat" panose="00000500000000000000" pitchFamily="2" charset="0"/>
-                <a:ea typeface="Calibri" panose="020F0502020204030204" pitchFamily="34" charset="0"/>
-                <a:cs typeface="Segoe UI" panose="020B0502040204020203" pitchFamily="34" charset="0"/>
-              </a:rPr>
-              <a:t>src</a:t>
-            </a:r>
-            <a:r>
-              <a:rPr lang="en-GB" sz="1800" b="1" dirty="0">
-                <a:solidFill>
-                  <a:srgbClr val="2E2D2C"/>
-                </a:solidFill>
-                <a:effectLst/>
-                <a:latin typeface="Montserrat" panose="00000500000000000000" pitchFamily="2" charset="0"/>
-                <a:ea typeface="Calibri" panose="020F0502020204030204" pitchFamily="34" charset="0"/>
-                <a:cs typeface="Segoe UI" panose="020B0502040204020203" pitchFamily="34" charset="0"/>
-              </a:rPr>
-              <a:t>/main/java</a:t>
-            </a:r>
-            <a:r>
-              <a:rPr lang="en-GB" sz="1800" dirty="0">
-                <a:solidFill>
-                  <a:srgbClr val="2E2D2C"/>
-                </a:solidFill>
-                <a:effectLst/>
-                <a:latin typeface="Montserrat Light" panose="00000400000000000000" pitchFamily="2" charset="0"/>
-                <a:ea typeface="Calibri" panose="020F0502020204030204" pitchFamily="34" charset="0"/>
-                <a:cs typeface="Segoe UI" panose="020B0502040204020203" pitchFamily="34" charset="0"/>
-              </a:rPr>
-              <a:t> folder</a:t>
+              <a:t>How did you approach version control?</a:t>
             </a:r>
             <a:endParaRPr lang="en-GB" dirty="0"/>
           </a:p>
@@ -4868,7 +5031,7 @@
     </p:spTree>
     <p:extLst>
       <p:ext uri="{BB962C8B-B14F-4D97-AF65-F5344CB8AC3E}">
-        <p14:creationId xmlns:p14="http://schemas.microsoft.com/office/powerpoint/2010/main" val="2136755552"/>
+        <p14:creationId xmlns:p14="http://schemas.microsoft.com/office/powerpoint/2010/main" val="1034101387"/>
       </p:ext>
     </p:extLst>
   </p:cSld>
@@ -4900,7 +5063,7 @@
           <p:cNvPr id="2" name="Title 1">
             <a:extLst>
               <a:ext uri="{FF2B5EF4-FFF2-40B4-BE49-F238E27FC236}">
-                <a16:creationId xmlns:a16="http://schemas.microsoft.com/office/drawing/2014/main" id="{DEE579FC-0C98-9B63-C36B-2C137AE2EEF8}"/>
+                <a16:creationId xmlns:a16="http://schemas.microsoft.com/office/drawing/2014/main" id="{6D050264-48EB-031E-A16C-065D4A8A0174}"/>
               </a:ext>
             </a:extLst>
           </p:cNvPr>
@@ -4911,21 +5074,14 @@
             <p:ph type="title"/>
           </p:nvPr>
         </p:nvSpPr>
-        <p:spPr>
-          <a:xfrm>
-            <a:off x="1097280" y="263529"/>
-            <a:ext cx="10058400" cy="1450757"/>
-          </a:xfrm>
-        </p:spPr>
-        <p:txBody>
-          <a:bodyPr>
-            <a:normAutofit/>
-          </a:bodyPr>
+        <p:spPr/>
+        <p:txBody>
+          <a:bodyPr/>
           <a:lstStyle/>
           <a:p>
             <a:r>
               <a:rPr lang="en-GB" dirty="0"/>
-              <a:t>Demonstration – User Story 1</a:t>
+              <a:t>Testing</a:t>
             </a:r>
           </a:p>
         </p:txBody>
@@ -4935,7 +5091,7 @@
           <p:cNvPr id="3" name="Content Placeholder 2">
             <a:extLst>
               <a:ext uri="{FF2B5EF4-FFF2-40B4-BE49-F238E27FC236}">
-                <a16:creationId xmlns:a16="http://schemas.microsoft.com/office/drawing/2014/main" id="{741CE052-CA66-14A8-37C5-C9956CED10CE}"/>
+                <a16:creationId xmlns:a16="http://schemas.microsoft.com/office/drawing/2014/main" id="{65D8B2F5-1A48-3482-10B7-6754AE0F624C}"/>
               </a:ext>
             </a:extLst>
           </p:cNvPr>
@@ -4951,6 +5107,54 @@
           <a:bodyPr/>
           <a:lstStyle/>
           <a:p>
+            <a:r>
+              <a:rPr lang="en-GB" sz="1800" dirty="0">
+                <a:solidFill>
+                  <a:srgbClr val="2E2D2C"/>
+                </a:solidFill>
+                <a:effectLst/>
+                <a:latin typeface="Montserrat Light" panose="00000400000000000000" pitchFamily="2" charset="0"/>
+                <a:ea typeface="Calibri" panose="020F0502020204030204" pitchFamily="34" charset="0"/>
+                <a:cs typeface="Segoe UI" panose="020B0502040204020203" pitchFamily="34" charset="0"/>
+              </a:rPr>
+              <a:t>What was tested? Show the coverage of the </a:t>
+            </a:r>
+            <a:r>
+              <a:rPr lang="en-GB" sz="1800" b="1" dirty="0" err="1">
+                <a:solidFill>
+                  <a:srgbClr val="2E2D2C"/>
+                </a:solidFill>
+                <a:effectLst/>
+                <a:latin typeface="Montserrat" panose="00000500000000000000" pitchFamily="2" charset="0"/>
+                <a:ea typeface="Calibri" panose="020F0502020204030204" pitchFamily="34" charset="0"/>
+                <a:cs typeface="Segoe UI" panose="020B0502040204020203" pitchFamily="34" charset="0"/>
+              </a:rPr>
+              <a:t>src</a:t>
+            </a:r>
+            <a:r>
+              <a:rPr lang="en-GB" sz="1800" b="1" dirty="0">
+                <a:solidFill>
+                  <a:srgbClr val="2E2D2C"/>
+                </a:solidFill>
+                <a:effectLst/>
+                <a:latin typeface="Montserrat" panose="00000500000000000000" pitchFamily="2" charset="0"/>
+                <a:ea typeface="Calibri" panose="020F0502020204030204" pitchFamily="34" charset="0"/>
+                <a:cs typeface="Segoe UI" panose="020B0502040204020203" pitchFamily="34" charset="0"/>
+              </a:rPr>
+              <a:t>/main/java</a:t>
+            </a:r>
+            <a:r>
+              <a:rPr lang="en-GB" sz="1800" dirty="0">
+                <a:solidFill>
+                  <a:srgbClr val="2E2D2C"/>
+                </a:solidFill>
+                <a:effectLst/>
+                <a:latin typeface="Montserrat Light" panose="00000400000000000000" pitchFamily="2" charset="0"/>
+                <a:ea typeface="Calibri" panose="020F0502020204030204" pitchFamily="34" charset="0"/>
+                <a:cs typeface="Segoe UI" panose="020B0502040204020203" pitchFamily="34" charset="0"/>
+              </a:rPr>
+              <a:t> folder</a:t>
+            </a:r>
             <a:endParaRPr lang="en-GB" dirty="0"/>
           </a:p>
         </p:txBody>
@@ -4958,7 +5162,7 @@
     </p:spTree>
     <p:extLst>
       <p:ext uri="{BB962C8B-B14F-4D97-AF65-F5344CB8AC3E}">
-        <p14:creationId xmlns:p14="http://schemas.microsoft.com/office/powerpoint/2010/main" val="1795351193"/>
+        <p14:creationId xmlns:p14="http://schemas.microsoft.com/office/powerpoint/2010/main" val="2136755552"/>
       </p:ext>
     </p:extLst>
   </p:cSld>
@@ -4990,7 +5194,7 @@
           <p:cNvPr id="2" name="Title 1">
             <a:extLst>
               <a:ext uri="{FF2B5EF4-FFF2-40B4-BE49-F238E27FC236}">
-                <a16:creationId xmlns:a16="http://schemas.microsoft.com/office/drawing/2014/main" id="{BFE7D69A-235E-7CED-F7CE-AE52C34147F0}"/>
+                <a16:creationId xmlns:a16="http://schemas.microsoft.com/office/drawing/2014/main" id="{DEE579FC-0C98-9B63-C36B-2C137AE2EEF8}"/>
               </a:ext>
             </a:extLst>
           </p:cNvPr>
@@ -5001,47 +5205,54 @@
             <p:ph type="title"/>
           </p:nvPr>
         </p:nvSpPr>
+        <p:spPr>
+          <a:xfrm>
+            <a:off x="1097280" y="263529"/>
+            <a:ext cx="10058400" cy="1450757"/>
+          </a:xfrm>
+        </p:spPr>
+        <p:txBody>
+          <a:bodyPr>
+            <a:normAutofit/>
+          </a:bodyPr>
+          <a:lstStyle/>
+          <a:p>
+            <a:r>
+              <a:rPr lang="en-GB" dirty="0"/>
+              <a:t>Demonstration – User Story 1</a:t>
+            </a:r>
+          </a:p>
+        </p:txBody>
+      </p:sp>
+      <p:sp>
+        <p:nvSpPr>
+          <p:cNvPr id="3" name="Content Placeholder 2">
+            <a:extLst>
+              <a:ext uri="{FF2B5EF4-FFF2-40B4-BE49-F238E27FC236}">
+                <a16:creationId xmlns:a16="http://schemas.microsoft.com/office/drawing/2014/main" id="{741CE052-CA66-14A8-37C5-C9956CED10CE}"/>
+              </a:ext>
+            </a:extLst>
+          </p:cNvPr>
+          <p:cNvSpPr>
+            <a:spLocks noGrp="1"/>
+          </p:cNvSpPr>
+          <p:nvPr>
+            <p:ph idx="1"/>
+          </p:nvPr>
+        </p:nvSpPr>
         <p:spPr/>
         <p:txBody>
           <a:bodyPr/>
           <a:lstStyle/>
           <a:p>
-            <a:r>
-              <a:rPr lang="en-GB" dirty="0"/>
-              <a:t>Demonstration – User Story 2</a:t>
-            </a:r>
-          </a:p>
-        </p:txBody>
-      </p:sp>
-      <p:sp>
-        <p:nvSpPr>
-          <p:cNvPr id="3" name="Content Placeholder 2">
-            <a:extLst>
-              <a:ext uri="{FF2B5EF4-FFF2-40B4-BE49-F238E27FC236}">
-                <a16:creationId xmlns:a16="http://schemas.microsoft.com/office/drawing/2014/main" id="{8C5D3FF6-4899-BC2A-9221-51FE5E8F8429}"/>
-              </a:ext>
-            </a:extLst>
-          </p:cNvPr>
-          <p:cNvSpPr>
-            <a:spLocks noGrp="1"/>
-          </p:cNvSpPr>
-          <p:nvPr>
-            <p:ph idx="1"/>
-          </p:nvPr>
-        </p:nvSpPr>
-        <p:spPr/>
-        <p:txBody>
-          <a:bodyPr/>
-          <a:lstStyle/>
-          <a:p>
-            <a:endParaRPr lang="en-GB"/>
+            <a:endParaRPr lang="en-GB" dirty="0"/>
           </a:p>
         </p:txBody>
       </p:sp>
     </p:spTree>
     <p:extLst>
       <p:ext uri="{BB962C8B-B14F-4D97-AF65-F5344CB8AC3E}">
-        <p14:creationId xmlns:p14="http://schemas.microsoft.com/office/powerpoint/2010/main" val="2531952844"/>
+        <p14:creationId xmlns:p14="http://schemas.microsoft.com/office/powerpoint/2010/main" val="1795351193"/>
       </p:ext>
     </p:extLst>
   </p:cSld>
@@ -5073,7 +5284,7 @@
           <p:cNvPr id="2" name="Title 1">
             <a:extLst>
               <a:ext uri="{FF2B5EF4-FFF2-40B4-BE49-F238E27FC236}">
-                <a16:creationId xmlns:a16="http://schemas.microsoft.com/office/drawing/2014/main" id="{C523B8EF-46EB-9166-C1EE-64A3B7E6CA0B}"/>
+                <a16:creationId xmlns:a16="http://schemas.microsoft.com/office/drawing/2014/main" id="{BFE7D69A-235E-7CED-F7CE-AE52C34147F0}"/>
               </a:ext>
             </a:extLst>
           </p:cNvPr>
@@ -5091,7 +5302,7 @@
           <a:p>
             <a:r>
               <a:rPr lang="en-GB" dirty="0"/>
-              <a:t>Demonstration – User Story 3</a:t>
+              <a:t>Demonstration – User Story 2</a:t>
             </a:r>
           </a:p>
         </p:txBody>
@@ -5101,7 +5312,7 @@
           <p:cNvPr id="3" name="Content Placeholder 2">
             <a:extLst>
               <a:ext uri="{FF2B5EF4-FFF2-40B4-BE49-F238E27FC236}">
-                <a16:creationId xmlns:a16="http://schemas.microsoft.com/office/drawing/2014/main" id="{060EFC0C-5B6A-1DB1-843B-31E7877D5F1A}"/>
+                <a16:creationId xmlns:a16="http://schemas.microsoft.com/office/drawing/2014/main" id="{8C5D3FF6-4899-BC2A-9221-51FE5E8F8429}"/>
               </a:ext>
             </a:extLst>
           </p:cNvPr>
@@ -5124,7 +5335,7 @@
     </p:spTree>
     <p:extLst>
       <p:ext uri="{BB962C8B-B14F-4D97-AF65-F5344CB8AC3E}">
-        <p14:creationId xmlns:p14="http://schemas.microsoft.com/office/powerpoint/2010/main" val="3628611131"/>
+        <p14:creationId xmlns:p14="http://schemas.microsoft.com/office/powerpoint/2010/main" val="2531952844"/>
       </p:ext>
     </p:extLst>
   </p:cSld>
@@ -5156,7 +5367,7 @@
           <p:cNvPr id="2" name="Title 1">
             <a:extLst>
               <a:ext uri="{FF2B5EF4-FFF2-40B4-BE49-F238E27FC236}">
-                <a16:creationId xmlns:a16="http://schemas.microsoft.com/office/drawing/2014/main" id="{2412AD8D-FCE1-FB4F-5DC5-00988D77EA0E}"/>
+                <a16:creationId xmlns:a16="http://schemas.microsoft.com/office/drawing/2014/main" id="{C523B8EF-46EB-9166-C1EE-64A3B7E6CA0B}"/>
               </a:ext>
             </a:extLst>
           </p:cNvPr>
@@ -5169,14 +5380,12 @@
         </p:nvSpPr>
         <p:spPr/>
         <p:txBody>
-          <a:bodyPr>
-            <a:normAutofit/>
-          </a:bodyPr>
+          <a:bodyPr/>
           <a:lstStyle/>
           <a:p>
             <a:r>
               <a:rPr lang="en-GB" dirty="0"/>
-              <a:t>Sprint Review</a:t>
+              <a:t>Demonstration – User Story 3</a:t>
             </a:r>
           </a:p>
         </p:txBody>
@@ -5186,7 +5395,7 @@
           <p:cNvPr id="3" name="Content Placeholder 2">
             <a:extLst>
               <a:ext uri="{FF2B5EF4-FFF2-40B4-BE49-F238E27FC236}">
-                <a16:creationId xmlns:a16="http://schemas.microsoft.com/office/drawing/2014/main" id="{2690E234-7B9C-A718-1EF8-F1EFF9A1423E}"/>
+                <a16:creationId xmlns:a16="http://schemas.microsoft.com/office/drawing/2014/main" id="{060EFC0C-5B6A-1DB1-843B-31E7877D5F1A}"/>
               </a:ext>
             </a:extLst>
           </p:cNvPr>
@@ -5202,107 +5411,14 @@
           <a:bodyPr/>
           <a:lstStyle/>
           <a:p>
-            <a:r>
-              <a:rPr lang="en-GB" sz="1800" dirty="0">
-                <a:solidFill>
-                  <a:srgbClr val="2E2D2C"/>
-                </a:solidFill>
-                <a:effectLst/>
-                <a:latin typeface="Montserrat Light" panose="00000400000000000000" pitchFamily="2" charset="0"/>
-                <a:ea typeface="Calibri" panose="020F0502020204030204" pitchFamily="34" charset="0"/>
-                <a:cs typeface="Segoe UI" panose="020B0502040204020203" pitchFamily="34" charset="0"/>
-              </a:rPr>
-              <a:t>What did you complete? What got left behind?</a:t>
-            </a:r>
-          </a:p>
-          <a:p>
-            <a:endParaRPr lang="en-GB" sz="1800" dirty="0">
-              <a:solidFill>
-                <a:srgbClr val="2E2D2C"/>
-              </a:solidFill>
-              <a:latin typeface="Montserrat Light" panose="00000400000000000000" pitchFamily="2" charset="0"/>
-              <a:cs typeface="Segoe UI" panose="020B0502040204020203" pitchFamily="34" charset="0"/>
-            </a:endParaRPr>
-          </a:p>
-          <a:p>
-            <a:r>
-              <a:rPr lang="en-GB" sz="1800" dirty="0">
-                <a:solidFill>
-                  <a:srgbClr val="2E2D2C"/>
-                </a:solidFill>
-                <a:latin typeface="Montserrat Light" panose="00000400000000000000" pitchFamily="2" charset="0"/>
-                <a:cs typeface="Segoe UI" panose="020B0502040204020203" pitchFamily="34" charset="0"/>
-              </a:rPr>
-              <a:t>Sprint 0 – Completed initial documentation, Jira board and created database tables</a:t>
-            </a:r>
-          </a:p>
-          <a:p>
-            <a:r>
-              <a:rPr lang="en-GB" sz="1800" dirty="0">
-                <a:solidFill>
-                  <a:srgbClr val="2E2D2C"/>
-                </a:solidFill>
-                <a:latin typeface="Montserrat Light" panose="00000400000000000000" pitchFamily="2" charset="0"/>
-                <a:cs typeface="Segoe UI" panose="020B0502040204020203" pitchFamily="34" charset="0"/>
-              </a:rPr>
-              <a:t>Sprint 1 –</a:t>
-            </a:r>
-          </a:p>
-          <a:p>
-            <a:r>
-              <a:rPr lang="en-GB" sz="1800" dirty="0">
-                <a:solidFill>
-                  <a:srgbClr val="2E2D2C"/>
-                </a:solidFill>
-                <a:latin typeface="Montserrat Light" panose="00000400000000000000" pitchFamily="2" charset="0"/>
-                <a:cs typeface="Segoe UI" panose="020B0502040204020203" pitchFamily="34" charset="0"/>
-              </a:rPr>
-              <a:t>Sprint 2 –</a:t>
-            </a:r>
-          </a:p>
-          <a:p>
-            <a:r>
-              <a:rPr lang="en-GB" sz="1800" dirty="0">
-                <a:solidFill>
-                  <a:srgbClr val="2E2D2C"/>
-                </a:solidFill>
-                <a:latin typeface="Montserrat Light" panose="00000400000000000000" pitchFamily="2" charset="0"/>
-                <a:cs typeface="Segoe UI" panose="020B0502040204020203" pitchFamily="34" charset="0"/>
-              </a:rPr>
-              <a:t>Sprint 3 –</a:t>
-            </a:r>
-          </a:p>
-          <a:p>
-            <a:r>
-              <a:rPr lang="en-GB" sz="1800" dirty="0">
-                <a:solidFill>
-                  <a:srgbClr val="2E2D2C"/>
-                </a:solidFill>
-                <a:latin typeface="Montserrat Light" panose="00000400000000000000" pitchFamily="2" charset="0"/>
-                <a:cs typeface="Segoe UI" panose="020B0502040204020203" pitchFamily="34" charset="0"/>
-              </a:rPr>
-              <a:t>Sprint 4 –</a:t>
-            </a:r>
-          </a:p>
-          <a:p>
-            <a:r>
-              <a:rPr lang="en-GB" sz="1800" dirty="0">
-                <a:solidFill>
-                  <a:srgbClr val="2E2D2C"/>
-                </a:solidFill>
-                <a:latin typeface="Montserrat Light" panose="00000400000000000000" pitchFamily="2" charset="0"/>
-                <a:cs typeface="Segoe UI" panose="020B0502040204020203" pitchFamily="34" charset="0"/>
-              </a:rPr>
-              <a:t>Sprint 5 -</a:t>
-            </a:r>
-            <a:endParaRPr lang="en-GB" dirty="0"/>
+            <a:endParaRPr lang="en-GB"/>
           </a:p>
         </p:txBody>
       </p:sp>
     </p:spTree>
     <p:extLst>
       <p:ext uri="{BB962C8B-B14F-4D97-AF65-F5344CB8AC3E}">
-        <p14:creationId xmlns:p14="http://schemas.microsoft.com/office/powerpoint/2010/main" val="1269700073"/>
+        <p14:creationId xmlns:p14="http://schemas.microsoft.com/office/powerpoint/2010/main" val="3628611131"/>
       </p:ext>
     </p:extLst>
   </p:cSld>

</xml_diff>